<commit_message>
Added content on presentation
</commit_message>
<xml_diff>
--- a/Sprint2/week3/interim presentation.pptx
+++ b/Sprint2/week3/interim presentation.pptx
@@ -145,7 +145,7 @@
 <file path=ppt/revisionInfo.xml><?xml version="1.0" encoding="utf-8"?>
 <p1510:revInfo xmlns:a="http://schemas.openxmlformats.org/drawingml/2006/main" xmlns:r="http://schemas.openxmlformats.org/officeDocument/2006/relationships" xmlns:p1510="http://schemas.microsoft.com/office/powerpoint/2015/10/main">
   <p1510:revLst>
-    <p1510:client id="{3F24E111-B7DA-47D8-9543-D9E86A11577B}" v="2" dt="2022-05-11T09:49:08.446"/>
+    <p1510:client id="{0F19D791-7FF5-4E21-8B6B-FFC2C7DDF952}" v="2" dt="2022-05-16T14:28:48.058"/>
   </p1510:revLst>
 </p1510:revInfo>
 </file>
@@ -503,6 +503,91 @@
       </pc:sldChg>
     </pc:docChg>
   </pc:docChgLst>
+  <pc:docChgLst>
+    <pc:chgData name="Zanders, Celine" userId="aabe59ea-19bd-4f85-bd14-717f915397f0" providerId="ADAL" clId="{0F19D791-7FF5-4E21-8B6B-FFC2C7DDF952}"/>
+    <pc:docChg chg="custSel modSld">
+      <pc:chgData name="Zanders, Celine" userId="aabe59ea-19bd-4f85-bd14-717f915397f0" providerId="ADAL" clId="{0F19D791-7FF5-4E21-8B6B-FFC2C7DDF952}" dt="2022-05-16T14:28:51.363" v="154" actId="27614"/>
+      <pc:docMkLst>
+        <pc:docMk/>
+      </pc:docMkLst>
+      <pc:sldChg chg="modSp mod">
+        <pc:chgData name="Zanders, Celine" userId="aabe59ea-19bd-4f85-bd14-717f915397f0" providerId="ADAL" clId="{0F19D791-7FF5-4E21-8B6B-FFC2C7DDF952}" dt="2022-05-16T13:58:48.846" v="74" actId="20577"/>
+        <pc:sldMkLst>
+          <pc:docMk/>
+          <pc:sldMk cId="645681891" sldId="297"/>
+        </pc:sldMkLst>
+        <pc:spChg chg="mod">
+          <ac:chgData name="Zanders, Celine" userId="aabe59ea-19bd-4f85-bd14-717f915397f0" providerId="ADAL" clId="{0F19D791-7FF5-4E21-8B6B-FFC2C7DDF952}" dt="2022-05-16T13:58:48.846" v="74" actId="20577"/>
+          <ac:spMkLst>
+            <pc:docMk/>
+            <pc:sldMk cId="645681891" sldId="297"/>
+            <ac:spMk id="13" creationId="{56680200-68FF-1C2B-4473-C18A85781CC8}"/>
+          </ac:spMkLst>
+        </pc:spChg>
+      </pc:sldChg>
+      <pc:sldChg chg="modSp mod">
+        <pc:chgData name="Zanders, Celine" userId="aabe59ea-19bd-4f85-bd14-717f915397f0" providerId="ADAL" clId="{0F19D791-7FF5-4E21-8B6B-FFC2C7DDF952}" dt="2022-05-16T14:08:39.074" v="120" actId="20577"/>
+        <pc:sldMkLst>
+          <pc:docMk/>
+          <pc:sldMk cId="142486075" sldId="298"/>
+        </pc:sldMkLst>
+        <pc:spChg chg="mod">
+          <ac:chgData name="Zanders, Celine" userId="aabe59ea-19bd-4f85-bd14-717f915397f0" providerId="ADAL" clId="{0F19D791-7FF5-4E21-8B6B-FFC2C7DDF952}" dt="2022-05-16T14:08:39.074" v="120" actId="20577"/>
+          <ac:spMkLst>
+            <pc:docMk/>
+            <pc:sldMk cId="142486075" sldId="298"/>
+            <ac:spMk id="13" creationId="{53E4D507-D404-8274-8A8F-805764914CB5}"/>
+          </ac:spMkLst>
+        </pc:spChg>
+      </pc:sldChg>
+      <pc:sldChg chg="addSp delSp modSp mod">
+        <pc:chgData name="Zanders, Celine" userId="aabe59ea-19bd-4f85-bd14-717f915397f0" providerId="ADAL" clId="{0F19D791-7FF5-4E21-8B6B-FFC2C7DDF952}" dt="2022-05-16T14:28:51.363" v="154" actId="27614"/>
+        <pc:sldMkLst>
+          <pc:docMk/>
+          <pc:sldMk cId="88466721" sldId="299"/>
+        </pc:sldMkLst>
+        <pc:spChg chg="del">
+          <ac:chgData name="Zanders, Celine" userId="aabe59ea-19bd-4f85-bd14-717f915397f0" providerId="ADAL" clId="{0F19D791-7FF5-4E21-8B6B-FFC2C7DDF952}" dt="2022-05-16T14:28:48.058" v="153"/>
+          <ac:spMkLst>
+            <pc:docMk/>
+            <pc:sldMk cId="88466721" sldId="299"/>
+            <ac:spMk id="3" creationId="{2A1A44F6-68F4-47F1-9DD8-1465DD46C18B}"/>
+          </ac:spMkLst>
+        </pc:spChg>
+        <pc:picChg chg="add mod">
+          <ac:chgData name="Zanders, Celine" userId="aabe59ea-19bd-4f85-bd14-717f915397f0" providerId="ADAL" clId="{0F19D791-7FF5-4E21-8B6B-FFC2C7DDF952}" dt="2022-05-16T14:28:51.363" v="154" actId="27614"/>
+          <ac:picMkLst>
+            <pc:docMk/>
+            <pc:sldMk cId="88466721" sldId="299"/>
+            <ac:picMk id="7" creationId="{AAA90567-5959-405E-B730-ABA55E41A911}"/>
+          </ac:picMkLst>
+        </pc:picChg>
+      </pc:sldChg>
+      <pc:sldChg chg="addSp modSp mod">
+        <pc:chgData name="Zanders, Celine" userId="aabe59ea-19bd-4f85-bd14-717f915397f0" providerId="ADAL" clId="{0F19D791-7FF5-4E21-8B6B-FFC2C7DDF952}" dt="2022-05-16T14:09:15.562" v="152" actId="1076"/>
+        <pc:sldMkLst>
+          <pc:docMk/>
+          <pc:sldMk cId="2955072160" sldId="300"/>
+        </pc:sldMkLst>
+        <pc:spChg chg="mod">
+          <ac:chgData name="Zanders, Celine" userId="aabe59ea-19bd-4f85-bd14-717f915397f0" providerId="ADAL" clId="{0F19D791-7FF5-4E21-8B6B-FFC2C7DDF952}" dt="2022-05-16T14:08:53.074" v="147" actId="5793"/>
+          <ac:spMkLst>
+            <pc:docMk/>
+            <pc:sldMk cId="2955072160" sldId="300"/>
+            <ac:spMk id="3" creationId="{4936DCEB-A432-42E8-95BC-798A19151359}"/>
+          </ac:spMkLst>
+        </pc:spChg>
+        <pc:picChg chg="add mod">
+          <ac:chgData name="Zanders, Celine" userId="aabe59ea-19bd-4f85-bd14-717f915397f0" providerId="ADAL" clId="{0F19D791-7FF5-4E21-8B6B-FFC2C7DDF952}" dt="2022-05-16T14:09:15.562" v="152" actId="1076"/>
+          <ac:picMkLst>
+            <pc:docMk/>
+            <pc:sldMk cId="2955072160" sldId="300"/>
+            <ac:picMk id="7" creationId="{818584CE-3A8D-4CDF-BDF4-E51553F71F5C}"/>
+          </ac:picMkLst>
+        </pc:picChg>
+      </pc:sldChg>
+    </pc:docChg>
+  </pc:docChgLst>
 </pc:chgInfo>
 </file>
 
@@ -588,7 +673,7 @@
           <a:p>
             <a:fld id="{05F25DE2-B715-4EA4-8CF0-DA425EA806A7}" type="datetimeFigureOut">
               <a:rPr lang="en-GB" smtClean="0"/>
-              <a:t>11/05/2022</a:t>
+              <a:t>16/05/2022</a:t>
             </a:fld>
             <a:endParaRPr lang="en-GB"/>
           </a:p>
@@ -9550,6 +9635,40 @@
           <a:bodyPr/>
           <a:lstStyle/>
           <a:p>
+            <a:pPr marL="342900" indent="-342900">
+              <a:buFont typeface="Arial" panose="020B0604020202020204" pitchFamily="34" charset="0"/>
+              <a:buChar char="•"/>
+            </a:pPr>
+            <a:r>
+              <a:rPr lang="en-US" dirty="0"/>
+              <a:t>Sort disks</a:t>
+            </a:r>
+          </a:p>
+          <a:p>
+            <a:pPr marL="342900" indent="-342900">
+              <a:buFont typeface="Arial" panose="020B0604020202020204" pitchFamily="34" charset="0"/>
+              <a:buChar char="•"/>
+            </a:pPr>
+            <a:r>
+              <a:rPr lang="en-US" dirty="0"/>
+              <a:t>Pick disk from belt</a:t>
+            </a:r>
+          </a:p>
+          <a:p>
+            <a:pPr marL="342900" indent="-342900">
+              <a:buFont typeface="Arial" panose="020B0604020202020204" pitchFamily="34" charset="0"/>
+              <a:buChar char="•"/>
+            </a:pPr>
+            <a:r>
+              <a:rPr lang="en-US" dirty="0"/>
+              <a:t>Create melody based on disk pattern</a:t>
+            </a:r>
+          </a:p>
+          <a:p>
+            <a:pPr marL="342900" indent="-342900">
+              <a:buFont typeface="Arial" panose="020B0604020202020204" pitchFamily="34" charset="0"/>
+              <a:buChar char="•"/>
+            </a:pPr>
             <a:endParaRPr lang="en-US" dirty="0"/>
           </a:p>
         </p:txBody>
@@ -9750,7 +9869,54 @@
           <a:bodyPr/>
           <a:lstStyle/>
           <a:p>
-            <a:endParaRPr lang="en-US"/>
+            <a:pPr marL="342900" indent="-342900">
+              <a:buFont typeface="Arial" panose="020B0604020202020204" pitchFamily="34" charset="0"/>
+              <a:buChar char="•"/>
+            </a:pPr>
+            <a:r>
+              <a:rPr lang="en-US" dirty="0"/>
+              <a:t>Push</a:t>
+            </a:r>
+          </a:p>
+          <a:p>
+            <a:pPr marL="342900" indent="-342900">
+              <a:buFont typeface="Arial" panose="020B0604020202020204" pitchFamily="34" charset="0"/>
+              <a:buChar char="•"/>
+            </a:pPr>
+            <a:r>
+              <a:rPr lang="en-US" dirty="0"/>
+              <a:t>Grab</a:t>
+            </a:r>
+          </a:p>
+          <a:p>
+            <a:pPr marL="342900" indent="-342900">
+              <a:buFont typeface="Arial" panose="020B0604020202020204" pitchFamily="34" charset="0"/>
+              <a:buChar char="•"/>
+            </a:pPr>
+            <a:r>
+              <a:rPr lang="en-US" dirty="0"/>
+              <a:t>2 servos</a:t>
+            </a:r>
+          </a:p>
+          <a:p>
+            <a:pPr marL="342900" indent="-342900">
+              <a:buFont typeface="Arial" panose="020B0604020202020204" pitchFamily="34" charset="0"/>
+              <a:buChar char="•"/>
+            </a:pPr>
+            <a:r>
+              <a:rPr lang="en-US" dirty="0"/>
+              <a:t>Optics</a:t>
+            </a:r>
+          </a:p>
+          <a:p>
+            <a:pPr marL="342900" indent="-342900">
+              <a:buFont typeface="Arial" panose="020B0604020202020204" pitchFamily="34" charset="0"/>
+              <a:buChar char="•"/>
+            </a:pPr>
+            <a:r>
+              <a:rPr lang="en-US" dirty="0"/>
+              <a:t>melody</a:t>
+            </a:r>
           </a:p>
         </p:txBody>
       </p:sp>
@@ -9941,7 +10107,41 @@
           <a:bodyPr/>
           <a:lstStyle/>
           <a:p>
-            <a:endParaRPr lang="en-NL"/>
+            <a:pPr marL="342900" indent="-342900">
+              <a:buFont typeface="Arial" panose="020B0604020202020204" pitchFamily="34" charset="0"/>
+              <a:buChar char="•"/>
+            </a:pPr>
+            <a:r>
+              <a:rPr lang="en-US" dirty="0"/>
+              <a:t>Pusher</a:t>
+            </a:r>
+          </a:p>
+          <a:p>
+            <a:pPr marL="342900" indent="-342900">
+              <a:buFont typeface="Arial" panose="020B0604020202020204" pitchFamily="34" charset="0"/>
+              <a:buChar char="•"/>
+            </a:pPr>
+            <a:r>
+              <a:rPr lang="en-US" dirty="0"/>
+              <a:t>2 servos</a:t>
+            </a:r>
+          </a:p>
+          <a:p>
+            <a:pPr marL="342900" indent="-342900">
+              <a:buFont typeface="Arial" panose="020B0604020202020204" pitchFamily="34" charset="0"/>
+              <a:buChar char="•"/>
+            </a:pPr>
+            <a:r>
+              <a:rPr lang="en-US" dirty="0"/>
+              <a:t>Grabber</a:t>
+            </a:r>
+          </a:p>
+          <a:p>
+            <a:pPr marL="342900" indent="-342900">
+              <a:buFont typeface="Arial" panose="020B0604020202020204" pitchFamily="34" charset="0"/>
+              <a:buChar char="•"/>
+            </a:pPr>
+            <a:endParaRPr lang="en-NL" dirty="0"/>
           </a:p>
         </p:txBody>
       </p:sp>
@@ -10007,6 +10207,42 @@
           </a:p>
         </p:txBody>
       </p:sp>
+      <p:pic>
+        <p:nvPicPr>
+          <p:cNvPr id="7" name="Picture 6" descr="A picture containing diagram&#10;&#10;Description automatically generated">
+            <a:extLst>
+              <a:ext uri="{FF2B5EF4-FFF2-40B4-BE49-F238E27FC236}">
+                <a16:creationId xmlns:a16="http://schemas.microsoft.com/office/drawing/2014/main" id="{818584CE-3A8D-4CDF-BDF4-E51553F71F5C}"/>
+              </a:ext>
+            </a:extLst>
+          </p:cNvPr>
+          <p:cNvPicPr>
+            <a:picLocks noChangeAspect="1"/>
+          </p:cNvPicPr>
+          <p:nvPr/>
+        </p:nvPicPr>
+        <p:blipFill>
+          <a:blip r:embed="rId2">
+            <a:extLst>
+              <a:ext uri="{28A0092B-C50C-407E-A947-70E740481C1C}">
+                <a14:useLocalDpi xmlns:a14="http://schemas.microsoft.com/office/drawing/2010/main" val="0"/>
+              </a:ext>
+            </a:extLst>
+          </a:blip>
+          <a:stretch>
+            <a:fillRect/>
+          </a:stretch>
+        </p:blipFill>
+        <p:spPr>
+          <a:xfrm>
+            <a:off x="5498370" y="1306642"/>
+            <a:ext cx="3513498" cy="2755900"/>
+          </a:xfrm>
+          <a:prstGeom prst="rect">
+            <a:avLst/>
+          </a:prstGeom>
+        </p:spPr>
+      </p:pic>
     </p:spTree>
     <p:extLst>
       <p:ext uri="{BB962C8B-B14F-4D97-AF65-F5344CB8AC3E}">
@@ -10086,31 +10322,41 @@
           </a:p>
         </p:txBody>
       </p:sp>
-      <p:sp>
-        <p:nvSpPr>
-          <p:cNvPr id="3" name="Content Placeholder 2">
+      <p:pic>
+        <p:nvPicPr>
+          <p:cNvPr id="7" name="Content Placeholder 6" descr="Diagram&#10;&#10;Description automatically generated">
             <a:extLst>
               <a:ext uri="{FF2B5EF4-FFF2-40B4-BE49-F238E27FC236}">
-                <a16:creationId xmlns:a16="http://schemas.microsoft.com/office/drawing/2014/main" id="{2A1A44F6-68F4-47F1-9DD8-1465DD46C18B}"/>
+                <a16:creationId xmlns:a16="http://schemas.microsoft.com/office/drawing/2014/main" id="{AAA90567-5959-405E-B730-ABA55E41A911}"/>
               </a:ext>
             </a:extLst>
           </p:cNvPr>
-          <p:cNvSpPr>
-            <a:spLocks noGrp="1"/>
-          </p:cNvSpPr>
+          <p:cNvPicPr>
+            <a:picLocks noGrp="1" noChangeAspect="1"/>
+          </p:cNvPicPr>
           <p:nvPr>
             <p:ph idx="1"/>
           </p:nvPr>
-        </p:nvSpPr>
-        <p:spPr/>
-        <p:txBody>
-          <a:bodyPr/>
-          <a:lstStyle/>
-          <a:p>
-            <a:endParaRPr lang="en-NL"/>
-          </a:p>
-        </p:txBody>
-      </p:sp>
+        </p:nvPicPr>
+        <p:blipFill>
+          <a:blip r:embed="rId2">
+            <a:extLst>
+              <a:ext uri="{28A0092B-C50C-407E-A947-70E740481C1C}">
+                <a14:useLocalDpi xmlns:a14="http://schemas.microsoft.com/office/drawing/2010/main" val="0"/>
+              </a:ext>
+            </a:extLst>
+          </a:blip>
+          <a:stretch>
+            <a:fillRect/>
+          </a:stretch>
+        </p:blipFill>
+        <p:spPr>
+          <a:xfrm>
+            <a:off x="758825" y="1930709"/>
+            <a:ext cx="7556500" cy="1674194"/>
+          </a:xfrm>
+        </p:spPr>
+      </p:pic>
       <p:sp>
         <p:nvSpPr>
           <p:cNvPr id="4" name="Footer Placeholder 3">
@@ -11162,15 +11408,6 @@
 </file>
 
 <file path=customXml/item1.xml><?xml version="1.0" encoding="utf-8"?>
-<?mso-contentType ?>
-<FormTemplates xmlns="http://schemas.microsoft.com/sharepoint/v3/contenttype/forms">
-  <Display>DocumentLibraryForm</Display>
-  <Edit>DocumentLibraryForm</Edit>
-  <New>DocumentLibraryForm</New>
-</FormTemplates>
-</file>
-
-<file path=customXml/item2.xml><?xml version="1.0" encoding="utf-8"?>
 <ct:contentTypeSchema xmlns:ct="http://schemas.microsoft.com/office/2006/metadata/contentType" xmlns:ma="http://schemas.microsoft.com/office/2006/metadata/properties/metaAttributes" ct:_="" ma:_="" ma:contentTypeName="Document" ma:contentTypeID="0x0101006BB6BF46F7EA1A4E983AF30979396F0C" ma:contentTypeVersion="11" ma:contentTypeDescription="Create a new document." ma:contentTypeScope="" ma:versionID="0bc695bc4ca3932d77ddce15281ce6c4">
   <xsd:schema xmlns:xsd="http://www.w3.org/2001/XMLSchema" xmlns:xs="http://www.w3.org/2001/XMLSchema" xmlns:p="http://schemas.microsoft.com/office/2006/metadata/properties" xmlns:ns3="d88cd4c5-2737-49bf-b4d4-a80908b4fb20" xmlns:ns4="73c1045c-5f0e-4ca3-bebc-b500b6a6fff8" targetNamespace="http://schemas.microsoft.com/office/2006/metadata/properties" ma:root="true" ma:fieldsID="f47bc992e5af26ccdc7a75bdcfd097ff" ns3:_="" ns4:_="">
     <xsd:import namespace="d88cd4c5-2737-49bf-b4d4-a80908b4fb20"/>
@@ -11381,6 +11618,15 @@
 </ct:contentTypeSchema>
 </file>
 
+<file path=customXml/item2.xml><?xml version="1.0" encoding="utf-8"?>
+<?mso-contentType ?>
+<FormTemplates xmlns="http://schemas.microsoft.com/sharepoint/v3/contenttype/forms">
+  <Display>DocumentLibraryForm</Display>
+  <Edit>DocumentLibraryForm</Edit>
+  <New>DocumentLibraryForm</New>
+</FormTemplates>
+</file>
+
 <file path=customXml/item3.xml><?xml version="1.0" encoding="utf-8"?>
 <p:properties xmlns:p="http://schemas.microsoft.com/office/2006/metadata/properties" xmlns:xsi="http://www.w3.org/2001/XMLSchema-instance" xmlns:pc="http://schemas.microsoft.com/office/infopath/2007/PartnerControls">
   <documentManagement/>
@@ -11388,14 +11634,6 @@
 </file>
 
 <file path=customXml/itemProps1.xml><?xml version="1.0" encoding="utf-8"?>
-<ds:datastoreItem xmlns:ds="http://schemas.openxmlformats.org/officeDocument/2006/customXml" ds:itemID="{A19CCF07-9C70-4B2E-B303-A21B764A0A64}">
-  <ds:schemaRefs>
-    <ds:schemaRef ds:uri="http://schemas.microsoft.com/sharepoint/v3/contenttype/forms"/>
-  </ds:schemaRefs>
-</ds:datastoreItem>
-</file>
-
-<file path=customXml/itemProps2.xml><?xml version="1.0" encoding="utf-8"?>
 <ds:datastoreItem xmlns:ds="http://schemas.openxmlformats.org/officeDocument/2006/customXml" ds:itemID="{B96F53C3-E26D-47D8-8438-BF380A60B9AE}">
   <ds:schemaRefs>
     <ds:schemaRef ds:uri="73c1045c-5f0e-4ca3-bebc-b500b6a6fff8"/>
@@ -11410,6 +11648,14 @@
     <ds:schemaRef ds:uri="http://schemas.microsoft.com/office/infopath/2007/PartnerControls"/>
     <ds:schemaRef ds:uri="http://schemas.openxmlformats.org/package/2006/metadata/core-properties"/>
     <ds:schemaRef ds:uri="http://www.w3.org/2001/XMLSchema"/>
+  </ds:schemaRefs>
+</ds:datastoreItem>
+</file>
+
+<file path=customXml/itemProps2.xml><?xml version="1.0" encoding="utf-8"?>
+<ds:datastoreItem xmlns:ds="http://schemas.openxmlformats.org/officeDocument/2006/customXml" ds:itemID="{A19CCF07-9C70-4B2E-B303-A21B764A0A64}">
+  <ds:schemaRefs>
+    <ds:schemaRef ds:uri="http://schemas.microsoft.com/sharepoint/v3/contenttype/forms"/>
   </ds:schemaRefs>
 </ds:datastoreItem>
 </file>

</xml_diff>